<commit_message>
Add 그리드뷰 4 ImageAdapter.getView( )
</commit_message>
<xml_diff>
--- a/Android/안드로이드 프로그래밍 정복/Chapter12 어댑터뷰.pptx
+++ b/Android/안드로이드 프로그래밍 정복/Chapter12 어댑터뷰.pptx
@@ -17,9 +17,10 @@
     <p:sldId id="265" r:id="rId11"/>
     <p:sldId id="267" r:id="rId12"/>
     <p:sldId id="268" r:id="rId13"/>
-    <p:sldId id="266" r:id="rId14"/>
-    <p:sldId id="269" r:id="rId15"/>
-    <p:sldId id="270" r:id="rId16"/>
+    <p:sldId id="271" r:id="rId14"/>
+    <p:sldId id="266" r:id="rId15"/>
+    <p:sldId id="269" r:id="rId16"/>
+    <p:sldId id="270" r:id="rId17"/>
   </p:sldIdLst>
   <p:sldSz cx="9144000" cy="6858000" type="screen4x3"/>
   <p:notesSz cx="6858000" cy="9144000"/>
@@ -3891,11 +3892,19 @@
           <a:p>
             <a:r>
               <a:rPr lang="en-US" altLang="ko-KR" dirty="0" smtClean="0"/>
-              <a:t>12.3.3 </a:t>
+              <a:t>13.3.2 </a:t>
+            </a:r>
+            <a:r>
+              <a:rPr lang="ko-KR" altLang="en-US" dirty="0" err="1" smtClean="0"/>
+              <a:t>그리드뷰</a:t>
             </a:r>
             <a:r>
               <a:rPr lang="ko-KR" altLang="en-US" dirty="0" smtClean="0"/>
-              <a:t>갤러리</a:t>
+              <a:t> </a:t>
+            </a:r>
+            <a:r>
+              <a:rPr lang="en-US" altLang="ko-KR" dirty="0" smtClean="0"/>
+              <a:t>4</a:t>
             </a:r>
             <a:endParaRPr lang="ko-KR" altLang="en-US" dirty="0"/>
           </a:p>
@@ -3914,45 +3923,236 @@
         <p:spPr/>
         <p:txBody>
           <a:bodyPr>
-            <a:normAutofit fontScale="92500" lnSpcReduction="10000"/>
+            <a:normAutofit fontScale="62500" lnSpcReduction="20000"/>
           </a:bodyPr>
           <a:lstStyle/>
           <a:p>
-            <a:r>
-              <a:rPr lang="ko-KR" altLang="en-US" dirty="0" smtClean="0"/>
-              <a:t>중앙에 고정되며 수평으로 스크롤되는 </a:t>
-            </a:r>
-            <a:r>
-              <a:rPr lang="ko-KR" altLang="en-US" dirty="0" err="1" smtClean="0"/>
-              <a:t>어댑터뷰</a:t>
+            <a:pPr>
+              <a:buNone/>
+            </a:pPr>
+            <a:r>
+              <a:rPr lang="en-US" altLang="ko-KR" dirty="0" err="1" smtClean="0"/>
+              <a:t>ImageAdapter.getView</a:t>
+            </a:r>
+            <a:r>
+              <a:rPr lang="en-US" altLang="ko-KR" dirty="0" smtClean="0"/>
+              <a:t>(</a:t>
             </a:r>
             <a:endParaRPr lang="en-US" altLang="ko-KR" dirty="0" smtClean="0"/>
           </a:p>
           <a:p>
+            <a:pPr>
+              <a:buNone/>
+            </a:pPr>
+            <a:r>
+              <a:rPr lang="en-US" altLang="ko-KR" dirty="0" smtClean="0"/>
+              <a:t>	</a:t>
+            </a:r>
+            <a:r>
+              <a:rPr lang="en-US" altLang="ko-KR" dirty="0" err="1" smtClean="0"/>
+              <a:t>int</a:t>
+            </a:r>
+            <a:r>
+              <a:rPr lang="en-US" altLang="ko-KR" dirty="0" smtClean="0"/>
+              <a:t> pos, View </a:t>
+            </a:r>
+            <a:r>
+              <a:rPr lang="en-US" altLang="ko-KR" dirty="0" err="1" smtClean="0"/>
+              <a:t>cv</a:t>
+            </a:r>
+            <a:r>
+              <a:rPr lang="en-US" altLang="ko-KR" dirty="0" smtClean="0"/>
+              <a:t>, </a:t>
+            </a:r>
+            <a:r>
+              <a:rPr lang="en-US" altLang="ko-KR" dirty="0" err="1" smtClean="0"/>
+              <a:t>ViewGroup</a:t>
+            </a:r>
+            <a:r>
+              <a:rPr lang="en-US" altLang="ko-KR" dirty="0" smtClean="0"/>
+              <a:t> vg) {</a:t>
+            </a:r>
+          </a:p>
+          <a:p>
+            <a:pPr>
+              <a:buNone/>
+            </a:pPr>
+            <a:r>
+              <a:rPr lang="en-US" altLang="ko-KR" dirty="0" smtClean="0"/>
+              <a:t>	</a:t>
+            </a:r>
+            <a:r>
+              <a:rPr lang="en-US" altLang="ko-KR" dirty="0" smtClean="0"/>
+              <a:t>if(</a:t>
+            </a:r>
+            <a:r>
+              <a:rPr lang="en-US" altLang="ko-KR" dirty="0" err="1" smtClean="0"/>
+              <a:t>cv</a:t>
+            </a:r>
+            <a:r>
+              <a:rPr lang="en-US" altLang="ko-KR" dirty="0" smtClean="0"/>
+              <a:t>==null) {</a:t>
+            </a:r>
+          </a:p>
+          <a:p>
+            <a:pPr>
+              <a:buNone/>
+            </a:pPr>
+            <a:r>
+              <a:rPr lang="en-US" altLang="ko-KR" dirty="0" smtClean="0"/>
+              <a:t>	</a:t>
+            </a:r>
+            <a:r>
+              <a:rPr lang="en-US" altLang="ko-KR" dirty="0" smtClean="0"/>
+              <a:t>	.	.	.</a:t>
+            </a:r>
+          </a:p>
+          <a:p>
+            <a:pPr>
+              <a:buNone/>
+            </a:pPr>
+            <a:r>
+              <a:rPr lang="en-US" altLang="ko-KR" dirty="0" smtClean="0"/>
+              <a:t>	</a:t>
+            </a:r>
+            <a:r>
+              <a:rPr lang="en-US" altLang="ko-KR" dirty="0" smtClean="0"/>
+              <a:t>	</a:t>
+            </a:r>
+            <a:r>
+              <a:rPr lang="en-US" altLang="ko-KR" dirty="0" err="1" smtClean="0"/>
+              <a:t>iv.setLayoutParams</a:t>
+            </a:r>
+            <a:r>
+              <a:rPr lang="en-US" altLang="ko-KR" dirty="0" smtClean="0"/>
+              <a:t>(new </a:t>
+            </a:r>
+            <a:r>
+              <a:rPr lang="en-US" altLang="ko-KR" dirty="0" err="1" smtClean="0"/>
+              <a:t>GriedView.LayoutParams</a:t>
+            </a:r>
+            <a:r>
+              <a:rPr lang="en-US" altLang="ko-KR" dirty="0" smtClean="0"/>
+              <a:t>(80,60) ;</a:t>
+            </a:r>
+          </a:p>
+          <a:p>
+            <a:pPr>
+              <a:buNone/>
+            </a:pPr>
+            <a:r>
+              <a:rPr lang="en-US" altLang="ko-KR" dirty="0" smtClean="0"/>
+              <a:t>	</a:t>
+            </a:r>
+            <a:r>
+              <a:rPr lang="en-US" altLang="ko-KR" dirty="0" smtClean="0"/>
+              <a:t>	</a:t>
+            </a:r>
+            <a:r>
+              <a:rPr lang="en-US" altLang="ko-KR" dirty="0" err="1" smtClean="0"/>
+              <a:t>iv.setAdjustViewBounds</a:t>
+            </a:r>
+            <a:r>
+              <a:rPr lang="en-US" altLang="ko-KR" dirty="0" smtClean="0"/>
+              <a:t>(false) ;	</a:t>
+            </a:r>
+            <a:r>
+              <a:rPr lang="en-US" altLang="ko-KR" dirty="0" err="1" smtClean="0"/>
+              <a:t>iv.setScaleType</a:t>
+            </a:r>
+            <a:r>
+              <a:rPr lang="en-US" altLang="ko-KR" dirty="0" smtClean="0"/>
+              <a:t>(</a:t>
+            </a:r>
+            <a:r>
+              <a:rPr lang="en-US" altLang="ko-KR" dirty="0" err="1" smtClean="0"/>
+              <a:t>ImageView.ScaleType.CENTER_CROP</a:t>
+            </a:r>
+            <a:r>
+              <a:rPr lang="en-US" altLang="ko-KR" dirty="0" smtClean="0"/>
+              <a:t>);</a:t>
+            </a:r>
+          </a:p>
+          <a:p>
+            <a:pPr>
+              <a:buNone/>
+            </a:pPr>
+            <a:r>
+              <a:rPr lang="en-US" altLang="ko-KR" dirty="0" smtClean="0"/>
+              <a:t>	</a:t>
+            </a:r>
+            <a:r>
+              <a:rPr lang="en-US" altLang="ko-KR" dirty="0" smtClean="0"/>
+              <a:t>}  else {</a:t>
+            </a:r>
+          </a:p>
+          <a:p>
+            <a:pPr>
+              <a:buNone/>
+            </a:pPr>
+            <a:r>
+              <a:rPr lang="en-US" altLang="ko-KR" dirty="0" smtClean="0"/>
+              <a:t>	</a:t>
+            </a:r>
+            <a:r>
+              <a:rPr lang="en-US" altLang="ko-KR" dirty="0" smtClean="0"/>
+              <a:t>	iv = (</a:t>
+            </a:r>
+            <a:r>
+              <a:rPr lang="en-US" altLang="ko-KR" dirty="0" err="1" smtClean="0"/>
+              <a:t>ImageView</a:t>
+            </a:r>
+            <a:r>
+              <a:rPr lang="en-US" altLang="ko-KR" dirty="0" smtClean="0"/>
+              <a:t>)</a:t>
+            </a:r>
+            <a:r>
+              <a:rPr lang="en-US" altLang="ko-KR" dirty="0" err="1" smtClean="0"/>
+              <a:t>cv</a:t>
+            </a:r>
+            <a:r>
+              <a:rPr lang="en-US" altLang="ko-KR" dirty="0" smtClean="0"/>
+              <a:t> ; }</a:t>
+            </a:r>
+          </a:p>
+          <a:p>
+            <a:pPr>
+              <a:buNone/>
+            </a:pPr>
+            <a:r>
+              <a:rPr lang="en-US" altLang="ko-KR" dirty="0" smtClean="0"/>
+              <a:t>	</a:t>
+            </a:r>
             <a:endParaRPr lang="en-US" altLang="ko-KR" dirty="0" smtClean="0"/>
           </a:p>
           <a:p>
-            <a:r>
-              <a:rPr lang="ko-KR" altLang="en-US" dirty="0" smtClean="0"/>
-              <a:t>이미지 </a:t>
-            </a:r>
-            <a:r>
-              <a:rPr lang="ko-KR" altLang="en-US" dirty="0" err="1" smtClean="0"/>
-              <a:t>선택기</a:t>
+            <a:pPr>
+              <a:buNone/>
+            </a:pPr>
+            <a:r>
+              <a:rPr lang="en-US" altLang="ko-KR" dirty="0" smtClean="0"/>
+              <a:t>	</a:t>
+            </a:r>
+            <a:r>
+              <a:rPr lang="en-US" altLang="ko-KR" dirty="0" err="1" smtClean="0"/>
+              <a:t>iv.setImageResource</a:t>
+            </a:r>
+            <a:r>
+              <a:rPr lang="en-US" altLang="ko-KR" dirty="0" smtClean="0"/>
+              <a:t>(picture[pos % 5 ]) ;</a:t>
+            </a:r>
+          </a:p>
+          <a:p>
+            <a:pPr>
+              <a:buNone/>
+            </a:pPr>
+            <a:r>
+              <a:rPr lang="en-US" altLang="ko-KR" dirty="0" smtClean="0"/>
+              <a:t>	</a:t>
             </a:r>
             <a:endParaRPr lang="en-US" altLang="ko-KR" dirty="0" smtClean="0"/>
           </a:p>
           <a:p>
-            <a:endParaRPr lang="en-US" altLang="ko-KR" dirty="0" smtClean="0"/>
-          </a:p>
-          <a:p>
-            <a:r>
-              <a:rPr lang="en-US" altLang="ko-KR" dirty="0" smtClean="0"/>
-              <a:t>layout</a:t>
-            </a:r>
-            <a:endParaRPr lang="en-US" altLang="ko-KR" dirty="0" smtClean="0"/>
-          </a:p>
-          <a:p>
             <a:pPr>
               <a:buNone/>
             </a:pPr>
@@ -3962,37 +4162,16 @@
             </a:r>
             <a:r>
               <a:rPr lang="en-US" altLang="ko-KR" dirty="0" smtClean="0"/>
-              <a:t>&lt;Gallery . . .</a:t>
-            </a:r>
-          </a:p>
-          <a:p>
-            <a:pPr>
-              <a:buNone/>
-            </a:pPr>
-            <a:r>
-              <a:rPr lang="en-US" altLang="ko-KR" dirty="0" smtClean="0"/>
-              <a:t>	</a:t>
-            </a:r>
-            <a:r>
-              <a:rPr lang="en-US" altLang="ko-KR" dirty="0" err="1" smtClean="0"/>
-              <a:t>android:animationDuration</a:t>
-            </a:r>
-            <a:r>
-              <a:rPr lang="en-US" altLang="ko-KR" dirty="0" smtClean="0"/>
-              <a:t>=“1500”</a:t>
-            </a:r>
-          </a:p>
-          <a:p>
-            <a:pPr>
-              <a:buNone/>
-            </a:pPr>
-            <a:r>
-              <a:rPr lang="en-US" altLang="ko-KR" dirty="0" smtClean="0"/>
-              <a:t>	</a:t>
-            </a:r>
-            <a:r>
-              <a:rPr lang="en-US" altLang="ko-KR" dirty="0" smtClean="0"/>
-              <a:t>/&gt;</a:t>
+              <a:t>return iv ;</a:t>
+            </a:r>
+          </a:p>
+          <a:p>
+            <a:pPr>
+              <a:buNone/>
+            </a:pPr>
+            <a:r>
+              <a:rPr lang="en-US" altLang="ko-KR" dirty="0" smtClean="0"/>
+              <a:t>}</a:t>
             </a:r>
             <a:endParaRPr lang="ko-KR" altLang="en-US" dirty="0"/>
           </a:p>
@@ -4003,13 +4182,6 @@
   <p:clrMapOvr>
     <a:masterClrMapping/>
   </p:clrMapOvr>
-  <p:timing>
-    <p:tnLst>
-      <p:par>
-        <p:cTn id="1" dur="indefinite" restart="never" nodeType="tmRoot"/>
-      </p:par>
-    </p:tnLst>
-  </p:timing>
 </p:sld>
 </file>
 
@@ -4051,6 +4223,162 @@
             </a:r>
             <a:r>
               <a:rPr lang="ko-KR" altLang="en-US" dirty="0" smtClean="0"/>
+              <a:t>갤러리</a:t>
+            </a:r>
+            <a:endParaRPr lang="ko-KR" altLang="en-US" dirty="0"/>
+          </a:p>
+        </p:txBody>
+      </p:sp>
+      <p:sp>
+        <p:nvSpPr>
+          <p:cNvPr id="3" name="내용 개체 틀 2"/>
+          <p:cNvSpPr>
+            <a:spLocks noGrp="1"/>
+          </p:cNvSpPr>
+          <p:nvPr>
+            <p:ph idx="1"/>
+          </p:nvPr>
+        </p:nvSpPr>
+        <p:spPr/>
+        <p:txBody>
+          <a:bodyPr>
+            <a:normAutofit fontScale="92500" lnSpcReduction="10000"/>
+          </a:bodyPr>
+          <a:lstStyle/>
+          <a:p>
+            <a:r>
+              <a:rPr lang="ko-KR" altLang="en-US" dirty="0" smtClean="0"/>
+              <a:t>중앙에 고정되며 수평으로 스크롤되는 </a:t>
+            </a:r>
+            <a:r>
+              <a:rPr lang="ko-KR" altLang="en-US" dirty="0" err="1" smtClean="0"/>
+              <a:t>어댑터뷰</a:t>
+            </a:r>
+            <a:endParaRPr lang="en-US" altLang="ko-KR" dirty="0" smtClean="0"/>
+          </a:p>
+          <a:p>
+            <a:endParaRPr lang="en-US" altLang="ko-KR" dirty="0" smtClean="0"/>
+          </a:p>
+          <a:p>
+            <a:r>
+              <a:rPr lang="ko-KR" altLang="en-US" dirty="0" smtClean="0"/>
+              <a:t>이미지 </a:t>
+            </a:r>
+            <a:r>
+              <a:rPr lang="ko-KR" altLang="en-US" dirty="0" err="1" smtClean="0"/>
+              <a:t>선택기</a:t>
+            </a:r>
+            <a:endParaRPr lang="en-US" altLang="ko-KR" dirty="0" smtClean="0"/>
+          </a:p>
+          <a:p>
+            <a:endParaRPr lang="en-US" altLang="ko-KR" dirty="0" smtClean="0"/>
+          </a:p>
+          <a:p>
+            <a:r>
+              <a:rPr lang="en-US" altLang="ko-KR" dirty="0" smtClean="0"/>
+              <a:t>layout</a:t>
+            </a:r>
+            <a:endParaRPr lang="en-US" altLang="ko-KR" dirty="0" smtClean="0"/>
+          </a:p>
+          <a:p>
+            <a:pPr>
+              <a:buNone/>
+            </a:pPr>
+            <a:r>
+              <a:rPr lang="en-US" altLang="ko-KR" dirty="0" smtClean="0"/>
+              <a:t>	</a:t>
+            </a:r>
+            <a:r>
+              <a:rPr lang="en-US" altLang="ko-KR" dirty="0" smtClean="0"/>
+              <a:t>&lt;Gallery . . .</a:t>
+            </a:r>
+          </a:p>
+          <a:p>
+            <a:pPr>
+              <a:buNone/>
+            </a:pPr>
+            <a:r>
+              <a:rPr lang="en-US" altLang="ko-KR" dirty="0" smtClean="0"/>
+              <a:t>	</a:t>
+            </a:r>
+            <a:r>
+              <a:rPr lang="en-US" altLang="ko-KR" dirty="0" err="1" smtClean="0"/>
+              <a:t>android:animationDuration</a:t>
+            </a:r>
+            <a:r>
+              <a:rPr lang="en-US" altLang="ko-KR" dirty="0" smtClean="0"/>
+              <a:t>=“1500”</a:t>
+            </a:r>
+          </a:p>
+          <a:p>
+            <a:pPr>
+              <a:buNone/>
+            </a:pPr>
+            <a:r>
+              <a:rPr lang="en-US" altLang="ko-KR" dirty="0" smtClean="0"/>
+              <a:t>	</a:t>
+            </a:r>
+            <a:r>
+              <a:rPr lang="en-US" altLang="ko-KR" dirty="0" smtClean="0"/>
+              <a:t>/&gt;</a:t>
+            </a:r>
+            <a:endParaRPr lang="ko-KR" altLang="en-US" dirty="0"/>
+          </a:p>
+        </p:txBody>
+      </p:sp>
+    </p:spTree>
+  </p:cSld>
+  <p:clrMapOvr>
+    <a:masterClrMapping/>
+  </p:clrMapOvr>
+  <p:timing>
+    <p:tnLst>
+      <p:par>
+        <p:cTn id="1" dur="indefinite" restart="never" nodeType="tmRoot"/>
+      </p:par>
+    </p:tnLst>
+  </p:timing>
+</p:sld>
+</file>
+
+<file path=ppt/slides/slide15.xml><?xml version="1.0" encoding="utf-8"?>
+<p:sld xmlns:a="http://schemas.openxmlformats.org/drawingml/2006/main" xmlns:r="http://schemas.openxmlformats.org/officeDocument/2006/relationships" xmlns:p="http://schemas.openxmlformats.org/presentationml/2006/main">
+  <p:cSld>
+    <p:spTree>
+      <p:nvGrpSpPr>
+        <p:cNvPr id="1" name=""/>
+        <p:cNvGrpSpPr/>
+        <p:nvPr/>
+      </p:nvGrpSpPr>
+      <p:grpSpPr>
+        <a:xfrm>
+          <a:off x="0" y="0"/>
+          <a:ext cx="0" cy="0"/>
+          <a:chOff x="0" y="0"/>
+          <a:chExt cx="0" cy="0"/>
+        </a:xfrm>
+      </p:grpSpPr>
+      <p:sp>
+        <p:nvSpPr>
+          <p:cNvPr id="2" name="제목 1"/>
+          <p:cNvSpPr>
+            <a:spLocks noGrp="1"/>
+          </p:cNvSpPr>
+          <p:nvPr>
+            <p:ph type="title"/>
+          </p:nvPr>
+        </p:nvSpPr>
+        <p:spPr/>
+        <p:txBody>
+          <a:bodyPr/>
+          <a:lstStyle/>
+          <a:p>
+            <a:r>
+              <a:rPr lang="en-US" altLang="ko-KR" dirty="0" smtClean="0"/>
+              <a:t>12.3.3 </a:t>
+            </a:r>
+            <a:r>
+              <a:rPr lang="ko-KR" altLang="en-US" dirty="0" smtClean="0"/>
               <a:t>갤러리 </a:t>
             </a:r>
             <a:r>
@@ -4201,7 +4529,7 @@
 </p:sld>
 </file>
 
-<file path=ppt/slides/slide15.xml><?xml version="1.0" encoding="utf-8"?>
+<file path=ppt/slides/slide16.xml><?xml version="1.0" encoding="utf-8"?>
 <p:sld xmlns:a="http://schemas.openxmlformats.org/drawingml/2006/main" xmlns:r="http://schemas.openxmlformats.org/officeDocument/2006/relationships" xmlns:p="http://schemas.openxmlformats.org/presentationml/2006/main">
   <p:cSld>
     <p:spTree>

</xml_diff>